<commit_message>
alexs part of the powerpoint done
</commit_message>
<xml_diff>
--- a/progressreport.pptx
+++ b/progressreport.pptx
@@ -10,7 +10,8 @@
     <p:sldId id="258" r:id="rId4"/>
     <p:sldId id="259" r:id="rId5"/>
     <p:sldId id="260" r:id="rId6"/>
-    <p:sldId id="261" r:id="rId7"/>
+    <p:sldId id="262" r:id="rId7"/>
+    <p:sldId id="263" r:id="rId8"/>
   </p:sldIdLst>
   <p:sldSz cx="12192000" cy="6858000"/>
   <p:notesSz cx="6858000" cy="9144000"/>
@@ -5927,26 +5928,13 @@
             </a:r>
             <a:r>
               <a:rPr lang="en-US" dirty="0"/>
-              <a:t>Alex’s progress:</a:t>
-            </a:r>
-          </a:p>
-          <a:p>
-            <a:pPr lvl="1"/>
-            <a:r>
-              <a:rPr lang="en-US" dirty="0"/>
-              <a:t>2a) Overview of entire term</a:t>
-            </a:r>
-          </a:p>
-          <a:p>
-            <a:pPr lvl="1"/>
-            <a:r>
-              <a:rPr lang="en-US" dirty="0"/>
-              <a:t>2b) Individual </a:t>
+              <a:t>Alex’s </a:t>
             </a:r>
             <a:r>
               <a:rPr lang="en-US" dirty="0" smtClean="0"/>
-              <a:t>contributions</a:t>
-            </a:r>
+              <a:t>progress</a:t>
+            </a:r>
+            <a:endParaRPr lang="en-US" dirty="0"/>
           </a:p>
           <a:p>
             <a:r>
@@ -6170,7 +6158,7 @@
           <a:p>
             <a:r>
               <a:rPr lang="en-US" dirty="0" smtClean="0"/>
-              <a:t>2a) Overview of entire term</a:t>
+              <a:t>Alex’s progress</a:t>
             </a:r>
             <a:endParaRPr lang="en-US" dirty="0"/>
           </a:p>
@@ -6188,18 +6176,20 @@
         </p:nvSpPr>
         <p:spPr/>
         <p:txBody>
-          <a:bodyPr/>
+          <a:bodyPr>
+            <a:normAutofit fontScale="85000" lnSpcReduction="10000"/>
+          </a:bodyPr>
           <a:lstStyle/>
           <a:p>
             <a:r>
               <a:rPr lang="en-US" dirty="0" smtClean="0"/>
-              <a:t>Weeks 1-2: Selected for project, met with our client Dr. Victor Hsu to understand exactly what he wanted us to achieve</a:t>
+              <a:t>Weeks 1-2: Selected for project, met with our client Dr. Victor Hsu to understand exactly what he wanted us to achieve.</a:t>
             </a:r>
           </a:p>
           <a:p>
             <a:r>
               <a:rPr lang="en-US" dirty="0" smtClean="0"/>
-              <a:t>Week 3: Continued to collaborate with Dr. Hsu and understand what the project would entail. Motivated by this collaboration, we made a project statement document. This document consisted of an abstract, a problem definition, a proposed solution, and performance metrics. We had Dr. Hsu review the document and he approved. We had some issues getting used to </a:t>
+              <a:t>Week 3: Continued to collaborate with Dr. Hsu and understand what the project would entail. Motivated by this collaboration, we made a project statement document. This document consisted of an abstract, a problem definition, a proposed solution, and performance metrics. My individual contribution consisted of writing the abstract, problem definition, proposed solution, and performance metrics sections. We had some issues getting used to </a:t>
             </a:r>
             <a:r>
               <a:rPr lang="en-US" dirty="0" err="1" smtClean="0"/>
@@ -6211,13 +6201,19 @@
             </a:r>
             <a:r>
               <a:rPr lang="en-US" dirty="0" smtClean="0"/>
-              <a:t>but overcame these to produce a well-formatted final edition of the paper. </a:t>
-            </a:r>
-          </a:p>
-          <a:p>
-            <a:r>
-              <a:rPr lang="en-US" smtClean="0"/>
-              <a:t>Week 4: </a:t>
+              <a:t>but overcame these to produce a well-formatted edition of the paper. We sent the document to Dr. Hsu for his approval.</a:t>
+            </a:r>
+          </a:p>
+          <a:p>
+            <a:r>
+              <a:rPr lang="en-US" dirty="0" smtClean="0"/>
+              <a:t>Week 4: We received feedback from Dr. Hsu and made the requisite changes to our project statement document, then he approved.</a:t>
+            </a:r>
+          </a:p>
+          <a:p>
+            <a:r>
+              <a:rPr lang="en-US" dirty="0" smtClean="0"/>
+              <a:t>Week 5: We began developing our project requirements document. I made individual progress by writing the document in Word. This document was formatted using the IEEE standard and thus consisted of an introduction, an overall description, specific requirements, and a Gantt chart. My individual contribution consisted of writing the introduction, an overall description, and the specific requirements.</a:t>
             </a:r>
             <a:endParaRPr lang="en-US" dirty="0"/>
           </a:p>
@@ -6270,7 +6266,7 @@
           <a:p>
             <a:r>
               <a:rPr lang="en-US" dirty="0" smtClean="0"/>
-              <a:t>2b) Individual contributions</a:t>
+              <a:t>Alex’s progress</a:t>
             </a:r>
             <a:endParaRPr lang="en-US" dirty="0"/>
           </a:p>
@@ -6288,17 +6284,186 @@
         </p:nvSpPr>
         <p:spPr/>
         <p:txBody>
-          <a:bodyPr/>
-          <a:lstStyle/>
-          <a:p>
-            <a:endParaRPr lang="en-US"/>
+          <a:bodyPr>
+            <a:normAutofit fontScale="92500" lnSpcReduction="20000"/>
+          </a:bodyPr>
+          <a:lstStyle/>
+          <a:p>
+            <a:r>
+              <a:rPr lang="en-US" dirty="0" smtClean="0"/>
+              <a:t>Week 6: I converted my progress on the project requirements document from Word to </a:t>
+            </a:r>
+            <a:r>
+              <a:rPr lang="en-US" dirty="0" err="1" smtClean="0"/>
+              <a:t>LaTex</a:t>
+            </a:r>
+            <a:r>
+              <a:rPr lang="en-US" dirty="0" smtClean="0"/>
+              <a:t>, using a template Jake worked on. After formatting my writing in </a:t>
+            </a:r>
+            <a:r>
+              <a:rPr lang="en-US" dirty="0" err="1" smtClean="0"/>
+              <a:t>LaTex</a:t>
+            </a:r>
+            <a:r>
+              <a:rPr lang="en-US" dirty="0" smtClean="0"/>
+              <a:t> and incorporating </a:t>
+            </a:r>
+            <a:r>
+              <a:rPr lang="en-US" dirty="0" err="1" smtClean="0"/>
+              <a:t>Chongxian’s</a:t>
+            </a:r>
+            <a:r>
+              <a:rPr lang="en-US" dirty="0" smtClean="0"/>
+              <a:t> Gantt chart, we submitted the document to Dr. Hsu and got his approval.</a:t>
+            </a:r>
+          </a:p>
+          <a:p>
+            <a:r>
+              <a:rPr lang="en-US" dirty="0" smtClean="0"/>
+              <a:t>Week 7: We made some final revisions of the project requirements document as requested from Dr. Winters. Individually, we made progress on our sections of the technology review document.</a:t>
+            </a:r>
+          </a:p>
+          <a:p>
+            <a:r>
+              <a:rPr lang="en-US" dirty="0" smtClean="0"/>
+              <a:t>Week 8: We each individually completed our technology review sections and incorporated them into one large </a:t>
+            </a:r>
+            <a:r>
+              <a:rPr lang="en-US" dirty="0" err="1" smtClean="0"/>
+              <a:t>LaTex</a:t>
+            </a:r>
+            <a:r>
+              <a:rPr lang="en-US" dirty="0" smtClean="0"/>
+              <a:t> formatted document. We faced some difficulty in coming up with responsibilities for each of us and realizing what technologies would be best suited to satisfy said responsibilities. My responsibilities were centered around the usability and appearance of the system. They were 1) the graphical user interface of the web page 2) a presentation of instructions to the user of the module and 3) the presentation of the machine learned bracket. After careful consideration, I landed on using </a:t>
+            </a:r>
+            <a:r>
+              <a:rPr lang="en-US" dirty="0" err="1" smtClean="0"/>
+              <a:t>PyGUI</a:t>
+            </a:r>
+            <a:r>
+              <a:rPr lang="en-US" dirty="0" smtClean="0"/>
+              <a:t> for 1), </a:t>
+            </a:r>
+            <a:r>
+              <a:rPr lang="en-US" dirty="0" err="1" smtClean="0"/>
+              <a:t>Webix</a:t>
+            </a:r>
+            <a:r>
+              <a:rPr lang="en-US" dirty="0" smtClean="0"/>
+              <a:t> for 2), and VTK for 3).</a:t>
+            </a:r>
+            <a:endParaRPr lang="en-US" dirty="0"/>
           </a:p>
         </p:txBody>
       </p:sp>
     </p:spTree>
     <p:extLst>
       <p:ext uri="{BB962C8B-B14F-4D97-AF65-F5344CB8AC3E}">
-        <p14:creationId xmlns:p14="http://schemas.microsoft.com/office/powerpoint/2010/main" val="2868857417"/>
+        <p14:creationId xmlns:p14="http://schemas.microsoft.com/office/powerpoint/2010/main" val="13649728"/>
+      </p:ext>
+    </p:extLst>
+  </p:cSld>
+  <p:clrMapOvr>
+    <a:masterClrMapping/>
+  </p:clrMapOvr>
+</p:sld>
+</file>
+
+<file path=ppt/slides/slide7.xml><?xml version="1.0" encoding="utf-8"?>
+<p:sld xmlns:a="http://schemas.openxmlformats.org/drawingml/2006/main" xmlns:r="http://schemas.openxmlformats.org/officeDocument/2006/relationships" xmlns:p="http://schemas.openxmlformats.org/presentationml/2006/main">
+  <p:cSld>
+    <p:spTree>
+      <p:nvGrpSpPr>
+        <p:cNvPr id="1" name=""/>
+        <p:cNvGrpSpPr/>
+        <p:nvPr/>
+      </p:nvGrpSpPr>
+      <p:grpSpPr>
+        <a:xfrm>
+          <a:off x="0" y="0"/>
+          <a:ext cx="0" cy="0"/>
+          <a:chOff x="0" y="0"/>
+          <a:chExt cx="0" cy="0"/>
+        </a:xfrm>
+      </p:grpSpPr>
+      <p:sp>
+        <p:nvSpPr>
+          <p:cNvPr id="2" name="Title 1"/>
+          <p:cNvSpPr>
+            <a:spLocks noGrp="1"/>
+          </p:cNvSpPr>
+          <p:nvPr>
+            <p:ph type="title"/>
+          </p:nvPr>
+        </p:nvSpPr>
+        <p:spPr/>
+        <p:txBody>
+          <a:bodyPr/>
+          <a:lstStyle/>
+          <a:p>
+            <a:r>
+              <a:rPr lang="en-US" dirty="0" smtClean="0"/>
+              <a:t>Alex’s progress</a:t>
+            </a:r>
+            <a:endParaRPr lang="en-US" dirty="0"/>
+          </a:p>
+        </p:txBody>
+      </p:sp>
+      <p:sp>
+        <p:nvSpPr>
+          <p:cNvPr id="3" name="Content Placeholder 2"/>
+          <p:cNvSpPr>
+            <a:spLocks noGrp="1"/>
+          </p:cNvSpPr>
+          <p:nvPr>
+            <p:ph idx="1"/>
+          </p:nvPr>
+        </p:nvSpPr>
+        <p:spPr/>
+        <p:txBody>
+          <a:bodyPr/>
+          <a:lstStyle/>
+          <a:p>
+            <a:r>
+              <a:rPr lang="en-US" dirty="0" smtClean="0"/>
+              <a:t>Week 9: We discussed as a team what approach we should take to the design document, and each individually landed on different software design templates. We also discussed how we would record ourselves for the progress report. One solution we considered was renting out a microphone from the library. As usual, we had some issues with </a:t>
+            </a:r>
+            <a:r>
+              <a:rPr lang="en-US" dirty="0" err="1" smtClean="0"/>
+              <a:t>LaTex</a:t>
+            </a:r>
+            <a:r>
+              <a:rPr lang="en-US" dirty="0" smtClean="0"/>
+              <a:t> formatting.</a:t>
+            </a:r>
+          </a:p>
+          <a:p>
+            <a:r>
+              <a:rPr lang="en-US" dirty="0" smtClean="0"/>
+              <a:t>Week 10: We finished and submitted our design document. I used sequence diagrams to describe the functionality of the technologies I selected. In my rationale, I included the average use case for each of my responsibilities.  It was difficult getting </a:t>
+            </a:r>
+            <a:r>
+              <a:rPr lang="en-US" dirty="0" err="1" smtClean="0"/>
+              <a:t>LaTex</a:t>
+            </a:r>
+            <a:r>
+              <a:rPr lang="en-US" dirty="0" smtClean="0"/>
+              <a:t> to properly generate the sequence diagrams, particularly because the packages I installed were being stubborn. </a:t>
+            </a:r>
+          </a:p>
+          <a:p>
+            <a:r>
+              <a:rPr lang="en-US" dirty="0" smtClean="0"/>
+              <a:t>Finals week: We got together and recorded this progress report.</a:t>
+            </a:r>
+          </a:p>
+        </p:txBody>
+      </p:sp>
+    </p:spTree>
+    <p:extLst>
+      <p:ext uri="{BB962C8B-B14F-4D97-AF65-F5344CB8AC3E}">
+        <p14:creationId xmlns:p14="http://schemas.microsoft.com/office/powerpoint/2010/main" val="2071498233"/>
       </p:ext>
     </p:extLst>
   </p:cSld>

</xml_diff>